<commit_message>
the drive for 5
</commit_message>
<xml_diff>
--- a/manuels/SYSTEM_UMWELT.pptx
+++ b/manuels/SYSTEM_UMWELT.pptx
@@ -2,12 +2,12 @@
 <file path=ppt/presentation.xml><?xml version="1.0" encoding="utf-8"?>
 <p:presentation xmlns:a="http://schemas.openxmlformats.org/drawingml/2006/main" xmlns:r="http://schemas.openxmlformats.org/officeDocument/2006/relationships" xmlns:p="http://schemas.openxmlformats.org/presentationml/2006/main" saveSubsetFonts="1">
   <p:sldMasterIdLst>
-    <p:sldMasterId id="2147483684" r:id="rId1"/>
+    <p:sldMasterId id="2147483696" r:id="rId1"/>
   </p:sldMasterIdLst>
   <p:sldIdLst>
     <p:sldId id="256" r:id="rId2"/>
   </p:sldIdLst>
-  <p:sldSz cx="7559675" cy="7199313"/>
+  <p:sldSz cx="8999538" cy="7199313"/>
   <p:notesSz cx="6858000" cy="9144000"/>
   <p:defaultTextStyle>
     <a:defPPr>
@@ -141,15 +141,15 @@
         </p:nvSpPr>
         <p:spPr>
           <a:xfrm>
-            <a:off x="566976" y="1178222"/>
-            <a:ext cx="6425724" cy="2506427"/>
+            <a:off x="674966" y="1178222"/>
+            <a:ext cx="7649607" cy="2506427"/>
           </a:xfrm>
         </p:spPr>
         <p:txBody>
           <a:bodyPr anchor="b"/>
           <a:lstStyle>
             <a:lvl1pPr algn="ctr">
-              <a:defRPr sz="4960"/>
+              <a:defRPr sz="5905"/>
             </a:lvl1pPr>
           </a:lstStyle>
           <a:p>
@@ -173,8 +173,8 @@
         </p:nvSpPr>
         <p:spPr>
           <a:xfrm>
-            <a:off x="944960" y="3781306"/>
-            <a:ext cx="5669756" cy="1738167"/>
+            <a:off x="1124942" y="3781306"/>
+            <a:ext cx="6749654" cy="1738167"/>
           </a:xfrm>
         </p:spPr>
         <p:txBody>
@@ -182,39 +182,39 @@
           <a:lstStyle>
             <a:lvl1pPr marL="0" indent="0" algn="ctr">
               <a:buNone/>
-              <a:defRPr sz="1984"/>
+              <a:defRPr sz="2362"/>
             </a:lvl1pPr>
-            <a:lvl2pPr marL="377967" indent="0" algn="ctr">
-              <a:buNone/>
-              <a:defRPr sz="1653"/>
+            <a:lvl2pPr marL="449976" indent="0" algn="ctr">
+              <a:buNone/>
+              <a:defRPr sz="1968"/>
             </a:lvl2pPr>
-            <a:lvl3pPr marL="755934" indent="0" algn="ctr">
-              <a:buNone/>
-              <a:defRPr sz="1488"/>
+            <a:lvl3pPr marL="899952" indent="0" algn="ctr">
+              <a:buNone/>
+              <a:defRPr sz="1772"/>
             </a:lvl3pPr>
-            <a:lvl4pPr marL="1133902" indent="0" algn="ctr">
-              <a:buNone/>
-              <a:defRPr sz="1323"/>
+            <a:lvl4pPr marL="1349929" indent="0" algn="ctr">
+              <a:buNone/>
+              <a:defRPr sz="1575"/>
             </a:lvl4pPr>
-            <a:lvl5pPr marL="1511869" indent="0" algn="ctr">
-              <a:buNone/>
-              <a:defRPr sz="1323"/>
+            <a:lvl5pPr marL="1799905" indent="0" algn="ctr">
+              <a:buNone/>
+              <a:defRPr sz="1575"/>
             </a:lvl5pPr>
-            <a:lvl6pPr marL="1889836" indent="0" algn="ctr">
-              <a:buNone/>
-              <a:defRPr sz="1323"/>
+            <a:lvl6pPr marL="2249881" indent="0" algn="ctr">
+              <a:buNone/>
+              <a:defRPr sz="1575"/>
             </a:lvl6pPr>
-            <a:lvl7pPr marL="2267803" indent="0" algn="ctr">
-              <a:buNone/>
-              <a:defRPr sz="1323"/>
+            <a:lvl7pPr marL="2699857" indent="0" algn="ctr">
+              <a:buNone/>
+              <a:defRPr sz="1575"/>
             </a:lvl7pPr>
-            <a:lvl8pPr marL="2645771" indent="0" algn="ctr">
-              <a:buNone/>
-              <a:defRPr sz="1323"/>
+            <a:lvl8pPr marL="3149834" indent="0" algn="ctr">
+              <a:buNone/>
+              <a:defRPr sz="1575"/>
             </a:lvl8pPr>
-            <a:lvl9pPr marL="3023738" indent="0" algn="ctr">
-              <a:buNone/>
-              <a:defRPr sz="1323"/>
+            <a:lvl9pPr marL="3599810" indent="0" algn="ctr">
+              <a:buNone/>
+              <a:defRPr sz="1575"/>
             </a:lvl9pPr>
           </a:lstStyle>
           <a:p>
@@ -243,7 +243,7 @@
           <a:p>
             <a:fld id="{E58B8B64-753F-4A42-8810-20F694BEFD2B}" type="datetimeFigureOut">
               <a:rPr lang="de-DE" smtClean="0"/>
-              <a:t>19.01.2014</a:t>
+              <a:t>23.01.2014</a:t>
             </a:fld>
             <a:endParaRPr lang="de-DE"/>
           </a:p>
@@ -294,7 +294,7 @@
     </p:spTree>
     <p:extLst>
       <p:ext uri="{BB962C8B-B14F-4D97-AF65-F5344CB8AC3E}">
-        <p14:creationId xmlns:p14="http://schemas.microsoft.com/office/powerpoint/2010/main" val="2413896161"/>
+        <p14:creationId xmlns:p14="http://schemas.microsoft.com/office/powerpoint/2010/main" val="2436000144"/>
       </p:ext>
     </p:extLst>
   </p:cSld>
@@ -413,7 +413,7 @@
           <a:p>
             <a:fld id="{E58B8B64-753F-4A42-8810-20F694BEFD2B}" type="datetimeFigureOut">
               <a:rPr lang="de-DE" smtClean="0"/>
-              <a:t>19.01.2014</a:t>
+              <a:t>23.01.2014</a:t>
             </a:fld>
             <a:endParaRPr lang="de-DE"/>
           </a:p>
@@ -464,7 +464,7 @@
     </p:spTree>
     <p:extLst>
       <p:ext uri="{BB962C8B-B14F-4D97-AF65-F5344CB8AC3E}">
-        <p14:creationId xmlns:p14="http://schemas.microsoft.com/office/powerpoint/2010/main" val="2526649493"/>
+        <p14:creationId xmlns:p14="http://schemas.microsoft.com/office/powerpoint/2010/main" val="3744865981"/>
       </p:ext>
     </p:extLst>
   </p:cSld>
@@ -503,8 +503,8 @@
         </p:nvSpPr>
         <p:spPr>
           <a:xfrm>
-            <a:off x="5409893" y="383297"/>
-            <a:ext cx="1630055" cy="6101085"/>
+            <a:off x="6440295" y="383297"/>
+            <a:ext cx="1940525" cy="6101085"/>
           </a:xfrm>
         </p:spPr>
         <p:txBody>
@@ -531,8 +531,8 @@
         </p:nvSpPr>
         <p:spPr>
           <a:xfrm>
-            <a:off x="519728" y="383297"/>
-            <a:ext cx="4795669" cy="6101085"/>
+            <a:off x="618719" y="383297"/>
+            <a:ext cx="5709082" cy="6101085"/>
           </a:xfrm>
         </p:spPr>
         <p:txBody>
@@ -593,7 +593,7 @@
           <a:p>
             <a:fld id="{E58B8B64-753F-4A42-8810-20F694BEFD2B}" type="datetimeFigureOut">
               <a:rPr lang="de-DE" smtClean="0"/>
-              <a:t>19.01.2014</a:t>
+              <a:t>23.01.2014</a:t>
             </a:fld>
             <a:endParaRPr lang="de-DE"/>
           </a:p>
@@ -644,7 +644,7 @@
     </p:spTree>
     <p:extLst>
       <p:ext uri="{BB962C8B-B14F-4D97-AF65-F5344CB8AC3E}">
-        <p14:creationId xmlns:p14="http://schemas.microsoft.com/office/powerpoint/2010/main" val="2291354210"/>
+        <p14:creationId xmlns:p14="http://schemas.microsoft.com/office/powerpoint/2010/main" val="1912487316"/>
       </p:ext>
     </p:extLst>
   </p:cSld>
@@ -763,7 +763,7 @@
           <a:p>
             <a:fld id="{E58B8B64-753F-4A42-8810-20F694BEFD2B}" type="datetimeFigureOut">
               <a:rPr lang="de-DE" smtClean="0"/>
-              <a:t>19.01.2014</a:t>
+              <a:t>23.01.2014</a:t>
             </a:fld>
             <a:endParaRPr lang="de-DE"/>
           </a:p>
@@ -814,7 +814,7 @@
     </p:spTree>
     <p:extLst>
       <p:ext uri="{BB962C8B-B14F-4D97-AF65-F5344CB8AC3E}">
-        <p14:creationId xmlns:p14="http://schemas.microsoft.com/office/powerpoint/2010/main" val="243727621"/>
+        <p14:creationId xmlns:p14="http://schemas.microsoft.com/office/powerpoint/2010/main" val="1598924316"/>
       </p:ext>
     </p:extLst>
   </p:cSld>
@@ -853,15 +853,15 @@
         </p:nvSpPr>
         <p:spPr>
           <a:xfrm>
-            <a:off x="515791" y="1794831"/>
-            <a:ext cx="6520220" cy="2994714"/>
+            <a:off x="614031" y="1794831"/>
+            <a:ext cx="7762102" cy="2994714"/>
           </a:xfrm>
         </p:spPr>
         <p:txBody>
           <a:bodyPr anchor="b"/>
           <a:lstStyle>
             <a:lvl1pPr>
-              <a:defRPr sz="4960"/>
+              <a:defRPr sz="5905"/>
             </a:lvl1pPr>
           </a:lstStyle>
           <a:p>
@@ -885,8 +885,8 @@
         </p:nvSpPr>
         <p:spPr>
           <a:xfrm>
-            <a:off x="515791" y="4817876"/>
-            <a:ext cx="6520220" cy="1574849"/>
+            <a:off x="614031" y="4817876"/>
+            <a:ext cx="7762102" cy="1574849"/>
           </a:xfrm>
         </p:spPr>
         <p:txBody>
@@ -894,15 +894,15 @@
           <a:lstStyle>
             <a:lvl1pPr marL="0" indent="0">
               <a:buNone/>
-              <a:defRPr sz="1984">
+              <a:defRPr sz="2362">
                 <a:solidFill>
                   <a:schemeClr val="tx1"/>
                 </a:solidFill>
               </a:defRPr>
             </a:lvl1pPr>
-            <a:lvl2pPr marL="377967" indent="0">
-              <a:buNone/>
-              <a:defRPr sz="1653">
+            <a:lvl2pPr marL="449976" indent="0">
+              <a:buNone/>
+              <a:defRPr sz="1968">
                 <a:solidFill>
                   <a:schemeClr val="tx1">
                     <a:tint val="75000"/>
@@ -910,9 +910,9 @@
                 </a:solidFill>
               </a:defRPr>
             </a:lvl2pPr>
-            <a:lvl3pPr marL="755934" indent="0">
-              <a:buNone/>
-              <a:defRPr sz="1488">
+            <a:lvl3pPr marL="899952" indent="0">
+              <a:buNone/>
+              <a:defRPr sz="1772">
                 <a:solidFill>
                   <a:schemeClr val="tx1">
                     <a:tint val="75000"/>
@@ -920,9 +920,9 @@
                 </a:solidFill>
               </a:defRPr>
             </a:lvl3pPr>
-            <a:lvl4pPr marL="1133902" indent="0">
-              <a:buNone/>
-              <a:defRPr sz="1323">
+            <a:lvl4pPr marL="1349929" indent="0">
+              <a:buNone/>
+              <a:defRPr sz="1575">
                 <a:solidFill>
                   <a:schemeClr val="tx1">
                     <a:tint val="75000"/>
@@ -930,9 +930,9 @@
                 </a:solidFill>
               </a:defRPr>
             </a:lvl4pPr>
-            <a:lvl5pPr marL="1511869" indent="0">
-              <a:buNone/>
-              <a:defRPr sz="1323">
+            <a:lvl5pPr marL="1799905" indent="0">
+              <a:buNone/>
+              <a:defRPr sz="1575">
                 <a:solidFill>
                   <a:schemeClr val="tx1">
                     <a:tint val="75000"/>
@@ -940,9 +940,9 @@
                 </a:solidFill>
               </a:defRPr>
             </a:lvl5pPr>
-            <a:lvl6pPr marL="1889836" indent="0">
-              <a:buNone/>
-              <a:defRPr sz="1323">
+            <a:lvl6pPr marL="2249881" indent="0">
+              <a:buNone/>
+              <a:defRPr sz="1575">
                 <a:solidFill>
                   <a:schemeClr val="tx1">
                     <a:tint val="75000"/>
@@ -950,9 +950,9 @@
                 </a:solidFill>
               </a:defRPr>
             </a:lvl6pPr>
-            <a:lvl7pPr marL="2267803" indent="0">
-              <a:buNone/>
-              <a:defRPr sz="1323">
+            <a:lvl7pPr marL="2699857" indent="0">
+              <a:buNone/>
+              <a:defRPr sz="1575">
                 <a:solidFill>
                   <a:schemeClr val="tx1">
                     <a:tint val="75000"/>
@@ -960,9 +960,9 @@
                 </a:solidFill>
               </a:defRPr>
             </a:lvl7pPr>
-            <a:lvl8pPr marL="2645771" indent="0">
-              <a:buNone/>
-              <a:defRPr sz="1323">
+            <a:lvl8pPr marL="3149834" indent="0">
+              <a:buNone/>
+              <a:defRPr sz="1575">
                 <a:solidFill>
                   <a:schemeClr val="tx1">
                     <a:tint val="75000"/>
@@ -970,9 +970,9 @@
                 </a:solidFill>
               </a:defRPr>
             </a:lvl8pPr>
-            <a:lvl9pPr marL="3023738" indent="0">
-              <a:buNone/>
-              <a:defRPr sz="1323">
+            <a:lvl9pPr marL="3599810" indent="0">
+              <a:buNone/>
+              <a:defRPr sz="1575">
                 <a:solidFill>
                   <a:schemeClr val="tx1">
                     <a:tint val="75000"/>
@@ -1007,7 +1007,7 @@
           <a:p>
             <a:fld id="{E58B8B64-753F-4A42-8810-20F694BEFD2B}" type="datetimeFigureOut">
               <a:rPr lang="de-DE" smtClean="0"/>
-              <a:t>19.01.2014</a:t>
+              <a:t>23.01.2014</a:t>
             </a:fld>
             <a:endParaRPr lang="de-DE"/>
           </a:p>
@@ -1058,7 +1058,7 @@
     </p:spTree>
     <p:extLst>
       <p:ext uri="{BB962C8B-B14F-4D97-AF65-F5344CB8AC3E}">
-        <p14:creationId xmlns:p14="http://schemas.microsoft.com/office/powerpoint/2010/main" val="728941963"/>
+        <p14:creationId xmlns:p14="http://schemas.microsoft.com/office/powerpoint/2010/main" val="1905872027"/>
       </p:ext>
     </p:extLst>
   </p:cSld>
@@ -1120,8 +1120,8 @@
         </p:nvSpPr>
         <p:spPr>
           <a:xfrm>
-            <a:off x="519728" y="1916484"/>
-            <a:ext cx="3212862" cy="4567898"/>
+            <a:off x="618718" y="1916484"/>
+            <a:ext cx="3824804" cy="4567898"/>
           </a:xfrm>
         </p:spPr>
         <p:txBody>
@@ -1177,8 +1177,8 @@
         </p:nvSpPr>
         <p:spPr>
           <a:xfrm>
-            <a:off x="3827085" y="1916484"/>
-            <a:ext cx="3212862" cy="4567898"/>
+            <a:off x="4556016" y="1916484"/>
+            <a:ext cx="3824804" cy="4567898"/>
           </a:xfrm>
         </p:spPr>
         <p:txBody>
@@ -1239,7 +1239,7 @@
           <a:p>
             <a:fld id="{E58B8B64-753F-4A42-8810-20F694BEFD2B}" type="datetimeFigureOut">
               <a:rPr lang="de-DE" smtClean="0"/>
-              <a:t>19.01.2014</a:t>
+              <a:t>23.01.2014</a:t>
             </a:fld>
             <a:endParaRPr lang="de-DE"/>
           </a:p>
@@ -1290,7 +1290,7 @@
     </p:spTree>
     <p:extLst>
       <p:ext uri="{BB962C8B-B14F-4D97-AF65-F5344CB8AC3E}">
-        <p14:creationId xmlns:p14="http://schemas.microsoft.com/office/powerpoint/2010/main" val="2660079792"/>
+        <p14:creationId xmlns:p14="http://schemas.microsoft.com/office/powerpoint/2010/main" val="2751917144"/>
       </p:ext>
     </p:extLst>
   </p:cSld>
@@ -1329,8 +1329,8 @@
         </p:nvSpPr>
         <p:spPr>
           <a:xfrm>
-            <a:off x="520712" y="383299"/>
-            <a:ext cx="6520220" cy="1391534"/>
+            <a:off x="619890" y="383299"/>
+            <a:ext cx="7762102" cy="1391534"/>
           </a:xfrm>
         </p:spPr>
         <p:txBody>
@@ -1357,8 +1357,8 @@
         </p:nvSpPr>
         <p:spPr>
           <a:xfrm>
-            <a:off x="520713" y="1764832"/>
-            <a:ext cx="3198096" cy="864917"/>
+            <a:off x="619891" y="1764832"/>
+            <a:ext cx="3807226" cy="864917"/>
           </a:xfrm>
         </p:spPr>
         <p:txBody>
@@ -1366,39 +1366,39 @@
           <a:lstStyle>
             <a:lvl1pPr marL="0" indent="0">
               <a:buNone/>
-              <a:defRPr sz="1984" b="1"/>
+              <a:defRPr sz="2362" b="1"/>
             </a:lvl1pPr>
-            <a:lvl2pPr marL="377967" indent="0">
-              <a:buNone/>
-              <a:defRPr sz="1653" b="1"/>
+            <a:lvl2pPr marL="449976" indent="0">
+              <a:buNone/>
+              <a:defRPr sz="1968" b="1"/>
             </a:lvl2pPr>
-            <a:lvl3pPr marL="755934" indent="0">
-              <a:buNone/>
-              <a:defRPr sz="1488" b="1"/>
+            <a:lvl3pPr marL="899952" indent="0">
+              <a:buNone/>
+              <a:defRPr sz="1772" b="1"/>
             </a:lvl3pPr>
-            <a:lvl4pPr marL="1133902" indent="0">
-              <a:buNone/>
-              <a:defRPr sz="1323" b="1"/>
+            <a:lvl4pPr marL="1349929" indent="0">
+              <a:buNone/>
+              <a:defRPr sz="1575" b="1"/>
             </a:lvl4pPr>
-            <a:lvl5pPr marL="1511869" indent="0">
-              <a:buNone/>
-              <a:defRPr sz="1323" b="1"/>
+            <a:lvl5pPr marL="1799905" indent="0">
+              <a:buNone/>
+              <a:defRPr sz="1575" b="1"/>
             </a:lvl5pPr>
-            <a:lvl6pPr marL="1889836" indent="0">
-              <a:buNone/>
-              <a:defRPr sz="1323" b="1"/>
+            <a:lvl6pPr marL="2249881" indent="0">
+              <a:buNone/>
+              <a:defRPr sz="1575" b="1"/>
             </a:lvl6pPr>
-            <a:lvl7pPr marL="2267803" indent="0">
-              <a:buNone/>
-              <a:defRPr sz="1323" b="1"/>
+            <a:lvl7pPr marL="2699857" indent="0">
+              <a:buNone/>
+              <a:defRPr sz="1575" b="1"/>
             </a:lvl7pPr>
-            <a:lvl8pPr marL="2645771" indent="0">
-              <a:buNone/>
-              <a:defRPr sz="1323" b="1"/>
+            <a:lvl8pPr marL="3149834" indent="0">
+              <a:buNone/>
+              <a:defRPr sz="1575" b="1"/>
             </a:lvl8pPr>
-            <a:lvl9pPr marL="3023738" indent="0">
-              <a:buNone/>
-              <a:defRPr sz="1323" b="1"/>
+            <a:lvl9pPr marL="3599810" indent="0">
+              <a:buNone/>
+              <a:defRPr sz="1575" b="1"/>
             </a:lvl9pPr>
           </a:lstStyle>
           <a:p>
@@ -1422,8 +1422,8 @@
         </p:nvSpPr>
         <p:spPr>
           <a:xfrm>
-            <a:off x="520713" y="2629749"/>
-            <a:ext cx="3198096" cy="3867965"/>
+            <a:off x="619891" y="2629749"/>
+            <a:ext cx="3807226" cy="3867965"/>
           </a:xfrm>
         </p:spPr>
         <p:txBody>
@@ -1479,8 +1479,8 @@
         </p:nvSpPr>
         <p:spPr>
           <a:xfrm>
-            <a:off x="3827086" y="1764832"/>
-            <a:ext cx="3213847" cy="864917"/>
+            <a:off x="4556017" y="1764832"/>
+            <a:ext cx="3825976" cy="864917"/>
           </a:xfrm>
         </p:spPr>
         <p:txBody>
@@ -1488,39 +1488,39 @@
           <a:lstStyle>
             <a:lvl1pPr marL="0" indent="0">
               <a:buNone/>
-              <a:defRPr sz="1984" b="1"/>
+              <a:defRPr sz="2362" b="1"/>
             </a:lvl1pPr>
-            <a:lvl2pPr marL="377967" indent="0">
-              <a:buNone/>
-              <a:defRPr sz="1653" b="1"/>
+            <a:lvl2pPr marL="449976" indent="0">
+              <a:buNone/>
+              <a:defRPr sz="1968" b="1"/>
             </a:lvl2pPr>
-            <a:lvl3pPr marL="755934" indent="0">
-              <a:buNone/>
-              <a:defRPr sz="1488" b="1"/>
+            <a:lvl3pPr marL="899952" indent="0">
+              <a:buNone/>
+              <a:defRPr sz="1772" b="1"/>
             </a:lvl3pPr>
-            <a:lvl4pPr marL="1133902" indent="0">
-              <a:buNone/>
-              <a:defRPr sz="1323" b="1"/>
+            <a:lvl4pPr marL="1349929" indent="0">
+              <a:buNone/>
+              <a:defRPr sz="1575" b="1"/>
             </a:lvl4pPr>
-            <a:lvl5pPr marL="1511869" indent="0">
-              <a:buNone/>
-              <a:defRPr sz="1323" b="1"/>
+            <a:lvl5pPr marL="1799905" indent="0">
+              <a:buNone/>
+              <a:defRPr sz="1575" b="1"/>
             </a:lvl5pPr>
-            <a:lvl6pPr marL="1889836" indent="0">
-              <a:buNone/>
-              <a:defRPr sz="1323" b="1"/>
+            <a:lvl6pPr marL="2249881" indent="0">
+              <a:buNone/>
+              <a:defRPr sz="1575" b="1"/>
             </a:lvl6pPr>
-            <a:lvl7pPr marL="2267803" indent="0">
-              <a:buNone/>
-              <a:defRPr sz="1323" b="1"/>
+            <a:lvl7pPr marL="2699857" indent="0">
+              <a:buNone/>
+              <a:defRPr sz="1575" b="1"/>
             </a:lvl7pPr>
-            <a:lvl8pPr marL="2645771" indent="0">
-              <a:buNone/>
-              <a:defRPr sz="1323" b="1"/>
+            <a:lvl8pPr marL="3149834" indent="0">
+              <a:buNone/>
+              <a:defRPr sz="1575" b="1"/>
             </a:lvl8pPr>
-            <a:lvl9pPr marL="3023738" indent="0">
-              <a:buNone/>
-              <a:defRPr sz="1323" b="1"/>
+            <a:lvl9pPr marL="3599810" indent="0">
+              <a:buNone/>
+              <a:defRPr sz="1575" b="1"/>
             </a:lvl9pPr>
           </a:lstStyle>
           <a:p>
@@ -1544,8 +1544,8 @@
         </p:nvSpPr>
         <p:spPr>
           <a:xfrm>
-            <a:off x="3827086" y="2629749"/>
-            <a:ext cx="3213847" cy="3867965"/>
+            <a:off x="4556017" y="2629749"/>
+            <a:ext cx="3825976" cy="3867965"/>
           </a:xfrm>
         </p:spPr>
         <p:txBody>
@@ -1606,7 +1606,7 @@
           <a:p>
             <a:fld id="{E58B8B64-753F-4A42-8810-20F694BEFD2B}" type="datetimeFigureOut">
               <a:rPr lang="de-DE" smtClean="0"/>
-              <a:t>19.01.2014</a:t>
+              <a:t>23.01.2014</a:t>
             </a:fld>
             <a:endParaRPr lang="de-DE"/>
           </a:p>
@@ -1657,7 +1657,7 @@
     </p:spTree>
     <p:extLst>
       <p:ext uri="{BB962C8B-B14F-4D97-AF65-F5344CB8AC3E}">
-        <p14:creationId xmlns:p14="http://schemas.microsoft.com/office/powerpoint/2010/main" val="2476334476"/>
+        <p14:creationId xmlns:p14="http://schemas.microsoft.com/office/powerpoint/2010/main" val="2838100065"/>
       </p:ext>
     </p:extLst>
   </p:cSld>
@@ -1724,7 +1724,7 @@
           <a:p>
             <a:fld id="{E58B8B64-753F-4A42-8810-20F694BEFD2B}" type="datetimeFigureOut">
               <a:rPr lang="de-DE" smtClean="0"/>
-              <a:t>19.01.2014</a:t>
+              <a:t>23.01.2014</a:t>
             </a:fld>
             <a:endParaRPr lang="de-DE"/>
           </a:p>
@@ -1775,7 +1775,7 @@
     </p:spTree>
     <p:extLst>
       <p:ext uri="{BB962C8B-B14F-4D97-AF65-F5344CB8AC3E}">
-        <p14:creationId xmlns:p14="http://schemas.microsoft.com/office/powerpoint/2010/main" val="2201170110"/>
+        <p14:creationId xmlns:p14="http://schemas.microsoft.com/office/powerpoint/2010/main" val="1204444613"/>
       </p:ext>
     </p:extLst>
   </p:cSld>
@@ -1819,7 +1819,7 @@
           <a:p>
             <a:fld id="{E58B8B64-753F-4A42-8810-20F694BEFD2B}" type="datetimeFigureOut">
               <a:rPr lang="de-DE" smtClean="0"/>
-              <a:t>19.01.2014</a:t>
+              <a:t>23.01.2014</a:t>
             </a:fld>
             <a:endParaRPr lang="de-DE"/>
           </a:p>
@@ -1870,7 +1870,7 @@
     </p:spTree>
     <p:extLst>
       <p:ext uri="{BB962C8B-B14F-4D97-AF65-F5344CB8AC3E}">
-        <p14:creationId xmlns:p14="http://schemas.microsoft.com/office/powerpoint/2010/main" val="1972763229"/>
+        <p14:creationId xmlns:p14="http://schemas.microsoft.com/office/powerpoint/2010/main" val="4206508789"/>
       </p:ext>
     </p:extLst>
   </p:cSld>
@@ -1909,15 +1909,15 @@
         </p:nvSpPr>
         <p:spPr>
           <a:xfrm>
-            <a:off x="520712" y="479954"/>
-            <a:ext cx="2438192" cy="1679840"/>
+            <a:off x="619891" y="479954"/>
+            <a:ext cx="2902585" cy="1679840"/>
           </a:xfrm>
         </p:spPr>
         <p:txBody>
           <a:bodyPr anchor="b"/>
           <a:lstStyle>
             <a:lvl1pPr>
-              <a:defRPr sz="2645"/>
+              <a:defRPr sz="3149"/>
             </a:lvl1pPr>
           </a:lstStyle>
           <a:p>
@@ -1941,39 +1941,39 @@
         </p:nvSpPr>
         <p:spPr>
           <a:xfrm>
-            <a:off x="3213847" y="1036570"/>
-            <a:ext cx="3827085" cy="5116178"/>
+            <a:off x="3825976" y="1036570"/>
+            <a:ext cx="4556016" cy="5116178"/>
           </a:xfrm>
         </p:spPr>
         <p:txBody>
           <a:bodyPr/>
           <a:lstStyle>
             <a:lvl1pPr>
-              <a:defRPr sz="2645"/>
+              <a:defRPr sz="3149"/>
             </a:lvl1pPr>
             <a:lvl2pPr>
-              <a:defRPr sz="2315"/>
+              <a:defRPr sz="2756"/>
             </a:lvl2pPr>
             <a:lvl3pPr>
-              <a:defRPr sz="1984"/>
+              <a:defRPr sz="2362"/>
             </a:lvl3pPr>
             <a:lvl4pPr>
-              <a:defRPr sz="1653"/>
+              <a:defRPr sz="1968"/>
             </a:lvl4pPr>
             <a:lvl5pPr>
-              <a:defRPr sz="1653"/>
+              <a:defRPr sz="1968"/>
             </a:lvl5pPr>
             <a:lvl6pPr>
-              <a:defRPr sz="1653"/>
+              <a:defRPr sz="1968"/>
             </a:lvl6pPr>
             <a:lvl7pPr>
-              <a:defRPr sz="1653"/>
+              <a:defRPr sz="1968"/>
             </a:lvl7pPr>
             <a:lvl8pPr>
-              <a:defRPr sz="1653"/>
+              <a:defRPr sz="1968"/>
             </a:lvl8pPr>
             <a:lvl9pPr>
-              <a:defRPr sz="1653"/>
+              <a:defRPr sz="1968"/>
             </a:lvl9pPr>
           </a:lstStyle>
           <a:p>
@@ -2026,8 +2026,8 @@
         </p:nvSpPr>
         <p:spPr>
           <a:xfrm>
-            <a:off x="520712" y="2159794"/>
-            <a:ext cx="2438192" cy="4001285"/>
+            <a:off x="619891" y="2159794"/>
+            <a:ext cx="2902585" cy="4001285"/>
           </a:xfrm>
         </p:spPr>
         <p:txBody>
@@ -2035,39 +2035,39 @@
           <a:lstStyle>
             <a:lvl1pPr marL="0" indent="0">
               <a:buNone/>
-              <a:defRPr sz="1323"/>
+              <a:defRPr sz="1575"/>
             </a:lvl1pPr>
-            <a:lvl2pPr marL="377967" indent="0">
-              <a:buNone/>
-              <a:defRPr sz="1157"/>
+            <a:lvl2pPr marL="449976" indent="0">
+              <a:buNone/>
+              <a:defRPr sz="1378"/>
             </a:lvl2pPr>
-            <a:lvl3pPr marL="755934" indent="0">
-              <a:buNone/>
-              <a:defRPr sz="992"/>
+            <a:lvl3pPr marL="899952" indent="0">
+              <a:buNone/>
+              <a:defRPr sz="1181"/>
             </a:lvl3pPr>
-            <a:lvl4pPr marL="1133902" indent="0">
-              <a:buNone/>
-              <a:defRPr sz="827"/>
+            <a:lvl4pPr marL="1349929" indent="0">
+              <a:buNone/>
+              <a:defRPr sz="984"/>
             </a:lvl4pPr>
-            <a:lvl5pPr marL="1511869" indent="0">
-              <a:buNone/>
-              <a:defRPr sz="827"/>
+            <a:lvl5pPr marL="1799905" indent="0">
+              <a:buNone/>
+              <a:defRPr sz="984"/>
             </a:lvl5pPr>
-            <a:lvl6pPr marL="1889836" indent="0">
-              <a:buNone/>
-              <a:defRPr sz="827"/>
+            <a:lvl6pPr marL="2249881" indent="0">
+              <a:buNone/>
+              <a:defRPr sz="984"/>
             </a:lvl6pPr>
-            <a:lvl7pPr marL="2267803" indent="0">
-              <a:buNone/>
-              <a:defRPr sz="827"/>
+            <a:lvl7pPr marL="2699857" indent="0">
+              <a:buNone/>
+              <a:defRPr sz="984"/>
             </a:lvl7pPr>
-            <a:lvl8pPr marL="2645771" indent="0">
-              <a:buNone/>
-              <a:defRPr sz="827"/>
+            <a:lvl8pPr marL="3149834" indent="0">
+              <a:buNone/>
+              <a:defRPr sz="984"/>
             </a:lvl8pPr>
-            <a:lvl9pPr marL="3023738" indent="0">
-              <a:buNone/>
-              <a:defRPr sz="827"/>
+            <a:lvl9pPr marL="3599810" indent="0">
+              <a:buNone/>
+              <a:defRPr sz="984"/>
             </a:lvl9pPr>
           </a:lstStyle>
           <a:p>
@@ -2096,7 +2096,7 @@
           <a:p>
             <a:fld id="{E58B8B64-753F-4A42-8810-20F694BEFD2B}" type="datetimeFigureOut">
               <a:rPr lang="de-DE" smtClean="0"/>
-              <a:t>19.01.2014</a:t>
+              <a:t>23.01.2014</a:t>
             </a:fld>
             <a:endParaRPr lang="de-DE"/>
           </a:p>
@@ -2147,7 +2147,7 @@
     </p:spTree>
     <p:extLst>
       <p:ext uri="{BB962C8B-B14F-4D97-AF65-F5344CB8AC3E}">
-        <p14:creationId xmlns:p14="http://schemas.microsoft.com/office/powerpoint/2010/main" val="1935756487"/>
+        <p14:creationId xmlns:p14="http://schemas.microsoft.com/office/powerpoint/2010/main" val="600616876"/>
       </p:ext>
     </p:extLst>
   </p:cSld>
@@ -2186,15 +2186,15 @@
         </p:nvSpPr>
         <p:spPr>
           <a:xfrm>
-            <a:off x="520712" y="479954"/>
-            <a:ext cx="2438192" cy="1679840"/>
+            <a:off x="619891" y="479954"/>
+            <a:ext cx="2902585" cy="1679840"/>
           </a:xfrm>
         </p:spPr>
         <p:txBody>
           <a:bodyPr anchor="b"/>
           <a:lstStyle>
             <a:lvl1pPr>
-              <a:defRPr sz="2645"/>
+              <a:defRPr sz="3149"/>
             </a:lvl1pPr>
           </a:lstStyle>
           <a:p>
@@ -2218,8 +2218,8 @@
         </p:nvSpPr>
         <p:spPr>
           <a:xfrm>
-            <a:off x="3213847" y="1036570"/>
-            <a:ext cx="3827085" cy="5116178"/>
+            <a:off x="3825976" y="1036570"/>
+            <a:ext cx="4556016" cy="5116178"/>
           </a:xfrm>
         </p:spPr>
         <p:txBody>
@@ -2227,39 +2227,39 @@
           <a:lstStyle>
             <a:lvl1pPr marL="0" indent="0">
               <a:buNone/>
-              <a:defRPr sz="2645"/>
+              <a:defRPr sz="3149"/>
             </a:lvl1pPr>
-            <a:lvl2pPr marL="377967" indent="0">
-              <a:buNone/>
-              <a:defRPr sz="2315"/>
+            <a:lvl2pPr marL="449976" indent="0">
+              <a:buNone/>
+              <a:defRPr sz="2756"/>
             </a:lvl2pPr>
-            <a:lvl3pPr marL="755934" indent="0">
-              <a:buNone/>
-              <a:defRPr sz="1984"/>
+            <a:lvl3pPr marL="899952" indent="0">
+              <a:buNone/>
+              <a:defRPr sz="2362"/>
             </a:lvl3pPr>
-            <a:lvl4pPr marL="1133902" indent="0">
-              <a:buNone/>
-              <a:defRPr sz="1653"/>
+            <a:lvl4pPr marL="1349929" indent="0">
+              <a:buNone/>
+              <a:defRPr sz="1968"/>
             </a:lvl4pPr>
-            <a:lvl5pPr marL="1511869" indent="0">
-              <a:buNone/>
-              <a:defRPr sz="1653"/>
+            <a:lvl5pPr marL="1799905" indent="0">
+              <a:buNone/>
+              <a:defRPr sz="1968"/>
             </a:lvl5pPr>
-            <a:lvl6pPr marL="1889836" indent="0">
-              <a:buNone/>
-              <a:defRPr sz="1653"/>
+            <a:lvl6pPr marL="2249881" indent="0">
+              <a:buNone/>
+              <a:defRPr sz="1968"/>
             </a:lvl6pPr>
-            <a:lvl7pPr marL="2267803" indent="0">
-              <a:buNone/>
-              <a:defRPr sz="1653"/>
+            <a:lvl7pPr marL="2699857" indent="0">
+              <a:buNone/>
+              <a:defRPr sz="1968"/>
             </a:lvl7pPr>
-            <a:lvl8pPr marL="2645771" indent="0">
-              <a:buNone/>
-              <a:defRPr sz="1653"/>
+            <a:lvl8pPr marL="3149834" indent="0">
+              <a:buNone/>
+              <a:defRPr sz="1968"/>
             </a:lvl8pPr>
-            <a:lvl9pPr marL="3023738" indent="0">
-              <a:buNone/>
-              <a:defRPr sz="1653"/>
+            <a:lvl9pPr marL="3599810" indent="0">
+              <a:buNone/>
+              <a:defRPr sz="1968"/>
             </a:lvl9pPr>
           </a:lstStyle>
           <a:p>
@@ -2283,8 +2283,8 @@
         </p:nvSpPr>
         <p:spPr>
           <a:xfrm>
-            <a:off x="520712" y="2159794"/>
-            <a:ext cx="2438192" cy="4001285"/>
+            <a:off x="619891" y="2159794"/>
+            <a:ext cx="2902585" cy="4001285"/>
           </a:xfrm>
         </p:spPr>
         <p:txBody>
@@ -2292,39 +2292,39 @@
           <a:lstStyle>
             <a:lvl1pPr marL="0" indent="0">
               <a:buNone/>
-              <a:defRPr sz="1323"/>
+              <a:defRPr sz="1575"/>
             </a:lvl1pPr>
-            <a:lvl2pPr marL="377967" indent="0">
-              <a:buNone/>
-              <a:defRPr sz="1157"/>
+            <a:lvl2pPr marL="449976" indent="0">
+              <a:buNone/>
+              <a:defRPr sz="1378"/>
             </a:lvl2pPr>
-            <a:lvl3pPr marL="755934" indent="0">
-              <a:buNone/>
-              <a:defRPr sz="992"/>
+            <a:lvl3pPr marL="899952" indent="0">
+              <a:buNone/>
+              <a:defRPr sz="1181"/>
             </a:lvl3pPr>
-            <a:lvl4pPr marL="1133902" indent="0">
-              <a:buNone/>
-              <a:defRPr sz="827"/>
+            <a:lvl4pPr marL="1349929" indent="0">
+              <a:buNone/>
+              <a:defRPr sz="984"/>
             </a:lvl4pPr>
-            <a:lvl5pPr marL="1511869" indent="0">
-              <a:buNone/>
-              <a:defRPr sz="827"/>
+            <a:lvl5pPr marL="1799905" indent="0">
+              <a:buNone/>
+              <a:defRPr sz="984"/>
             </a:lvl5pPr>
-            <a:lvl6pPr marL="1889836" indent="0">
-              <a:buNone/>
-              <a:defRPr sz="827"/>
+            <a:lvl6pPr marL="2249881" indent="0">
+              <a:buNone/>
+              <a:defRPr sz="984"/>
             </a:lvl6pPr>
-            <a:lvl7pPr marL="2267803" indent="0">
-              <a:buNone/>
-              <a:defRPr sz="827"/>
+            <a:lvl7pPr marL="2699857" indent="0">
+              <a:buNone/>
+              <a:defRPr sz="984"/>
             </a:lvl7pPr>
-            <a:lvl8pPr marL="2645771" indent="0">
-              <a:buNone/>
-              <a:defRPr sz="827"/>
+            <a:lvl8pPr marL="3149834" indent="0">
+              <a:buNone/>
+              <a:defRPr sz="984"/>
             </a:lvl8pPr>
-            <a:lvl9pPr marL="3023738" indent="0">
-              <a:buNone/>
-              <a:defRPr sz="827"/>
+            <a:lvl9pPr marL="3599810" indent="0">
+              <a:buNone/>
+              <a:defRPr sz="984"/>
             </a:lvl9pPr>
           </a:lstStyle>
           <a:p>
@@ -2353,7 +2353,7 @@
           <a:p>
             <a:fld id="{E58B8B64-753F-4A42-8810-20F694BEFD2B}" type="datetimeFigureOut">
               <a:rPr lang="de-DE" smtClean="0"/>
-              <a:t>19.01.2014</a:t>
+              <a:t>23.01.2014</a:t>
             </a:fld>
             <a:endParaRPr lang="de-DE"/>
           </a:p>
@@ -2404,7 +2404,7 @@
     </p:spTree>
     <p:extLst>
       <p:ext uri="{BB962C8B-B14F-4D97-AF65-F5344CB8AC3E}">
-        <p14:creationId xmlns:p14="http://schemas.microsoft.com/office/powerpoint/2010/main" val="2823538129"/>
+        <p14:creationId xmlns:p14="http://schemas.microsoft.com/office/powerpoint/2010/main" val="377873418"/>
       </p:ext>
     </p:extLst>
   </p:cSld>
@@ -2448,8 +2448,8 @@
         </p:nvSpPr>
         <p:spPr>
           <a:xfrm>
-            <a:off x="519728" y="383299"/>
-            <a:ext cx="6520220" cy="1391534"/>
+            <a:off x="618718" y="383299"/>
+            <a:ext cx="7762102" cy="1391534"/>
           </a:xfrm>
           <a:prstGeom prst="rect">
             <a:avLst/>
@@ -2481,8 +2481,8 @@
         </p:nvSpPr>
         <p:spPr>
           <a:xfrm>
-            <a:off x="519728" y="1916484"/>
-            <a:ext cx="6520220" cy="4567898"/>
+            <a:off x="618718" y="1916484"/>
+            <a:ext cx="7762102" cy="4567898"/>
           </a:xfrm>
           <a:prstGeom prst="rect">
             <a:avLst/>
@@ -2543,8 +2543,8 @@
         </p:nvSpPr>
         <p:spPr>
           <a:xfrm>
-            <a:off x="519728" y="6672698"/>
-            <a:ext cx="1700927" cy="383297"/>
+            <a:off x="618718" y="6672698"/>
+            <a:ext cx="2024896" cy="383297"/>
           </a:xfrm>
           <a:prstGeom prst="rect">
             <a:avLst/>
@@ -2554,7 +2554,7 @@
           <a:bodyPr vert="horz" lIns="91440" tIns="45720" rIns="91440" bIns="45720" rtlCol="0" anchor="ctr"/>
           <a:lstStyle>
             <a:lvl1pPr algn="l">
-              <a:defRPr sz="992">
+              <a:defRPr sz="1181">
                 <a:solidFill>
                   <a:schemeClr val="tx1">
                     <a:tint val="75000"/>
@@ -2566,7 +2566,7 @@
           <a:p>
             <a:fld id="{E58B8B64-753F-4A42-8810-20F694BEFD2B}" type="datetimeFigureOut">
               <a:rPr lang="de-DE" smtClean="0"/>
-              <a:t>19.01.2014</a:t>
+              <a:t>23.01.2014</a:t>
             </a:fld>
             <a:endParaRPr lang="de-DE"/>
           </a:p>
@@ -2584,8 +2584,8 @@
         </p:nvSpPr>
         <p:spPr>
           <a:xfrm>
-            <a:off x="2504143" y="6672698"/>
-            <a:ext cx="2551390" cy="383297"/>
+            <a:off x="2981097" y="6672698"/>
+            <a:ext cx="3037344" cy="383297"/>
           </a:xfrm>
           <a:prstGeom prst="rect">
             <a:avLst/>
@@ -2595,7 +2595,7 @@
           <a:bodyPr vert="horz" lIns="91440" tIns="45720" rIns="91440" bIns="45720" rtlCol="0" anchor="ctr"/>
           <a:lstStyle>
             <a:lvl1pPr algn="ctr">
-              <a:defRPr sz="992">
+              <a:defRPr sz="1181">
                 <a:solidFill>
                   <a:schemeClr val="tx1">
                     <a:tint val="75000"/>
@@ -2621,8 +2621,8 @@
         </p:nvSpPr>
         <p:spPr>
           <a:xfrm>
-            <a:off x="5339020" y="6672698"/>
-            <a:ext cx="1700927" cy="383297"/>
+            <a:off x="6355924" y="6672698"/>
+            <a:ext cx="2024896" cy="383297"/>
           </a:xfrm>
           <a:prstGeom prst="rect">
             <a:avLst/>
@@ -2632,7 +2632,7 @@
           <a:bodyPr vert="horz" lIns="91440" tIns="45720" rIns="91440" bIns="45720" rtlCol="0" anchor="ctr"/>
           <a:lstStyle>
             <a:lvl1pPr algn="r">
-              <a:defRPr sz="992">
+              <a:defRPr sz="1181">
                 <a:solidFill>
                   <a:schemeClr val="tx1">
                     <a:tint val="75000"/>
@@ -2653,27 +2653,27 @@
     </p:spTree>
     <p:extLst>
       <p:ext uri="{BB962C8B-B14F-4D97-AF65-F5344CB8AC3E}">
-        <p14:creationId xmlns:p14="http://schemas.microsoft.com/office/powerpoint/2010/main" val="417509020"/>
+        <p14:creationId xmlns:p14="http://schemas.microsoft.com/office/powerpoint/2010/main" val="1628774289"/>
       </p:ext>
     </p:extLst>
   </p:cSld>
   <p:clrMap bg1="lt1" tx1="dk1" bg2="lt2" tx2="dk2" accent1="accent1" accent2="accent2" accent3="accent3" accent4="accent4" accent5="accent5" accent6="accent6" hlink="hlink" folHlink="folHlink"/>
   <p:sldLayoutIdLst>
-    <p:sldLayoutId id="2147483685" r:id="rId1"/>
-    <p:sldLayoutId id="2147483686" r:id="rId2"/>
-    <p:sldLayoutId id="2147483687" r:id="rId3"/>
-    <p:sldLayoutId id="2147483688" r:id="rId4"/>
-    <p:sldLayoutId id="2147483689" r:id="rId5"/>
-    <p:sldLayoutId id="2147483690" r:id="rId6"/>
-    <p:sldLayoutId id="2147483691" r:id="rId7"/>
-    <p:sldLayoutId id="2147483692" r:id="rId8"/>
-    <p:sldLayoutId id="2147483693" r:id="rId9"/>
-    <p:sldLayoutId id="2147483694" r:id="rId10"/>
-    <p:sldLayoutId id="2147483695" r:id="rId11"/>
+    <p:sldLayoutId id="2147483697" r:id="rId1"/>
+    <p:sldLayoutId id="2147483698" r:id="rId2"/>
+    <p:sldLayoutId id="2147483699" r:id="rId3"/>
+    <p:sldLayoutId id="2147483700" r:id="rId4"/>
+    <p:sldLayoutId id="2147483701" r:id="rId5"/>
+    <p:sldLayoutId id="2147483702" r:id="rId6"/>
+    <p:sldLayoutId id="2147483703" r:id="rId7"/>
+    <p:sldLayoutId id="2147483704" r:id="rId8"/>
+    <p:sldLayoutId id="2147483705" r:id="rId9"/>
+    <p:sldLayoutId id="2147483706" r:id="rId10"/>
+    <p:sldLayoutId id="2147483707" r:id="rId11"/>
   </p:sldLayoutIdLst>
   <p:txStyles>
     <p:titleStyle>
-      <a:lvl1pPr algn="l" defTabSz="755934" rtl="0" eaLnBrk="1" latinLnBrk="0" hangingPunct="1">
+      <a:lvl1pPr algn="l" defTabSz="899952" rtl="0" eaLnBrk="1" latinLnBrk="0" hangingPunct="1">
         <a:lnSpc>
           <a:spcPct val="90000"/>
         </a:lnSpc>
@@ -2681,7 +2681,7 @@
           <a:spcPct val="0"/>
         </a:spcBef>
         <a:buNone/>
-        <a:defRPr sz="3637" kern="1200">
+        <a:defRPr sz="4330" kern="1200">
           <a:solidFill>
             <a:schemeClr val="tx1"/>
           </a:solidFill>
@@ -2692,16 +2692,16 @@
       </a:lvl1pPr>
     </p:titleStyle>
     <p:bodyStyle>
-      <a:lvl1pPr marL="188984" indent="-188984" algn="l" defTabSz="755934" rtl="0" eaLnBrk="1" latinLnBrk="0" hangingPunct="1">
+      <a:lvl1pPr marL="224988" indent="-224988" algn="l" defTabSz="899952" rtl="0" eaLnBrk="1" latinLnBrk="0" hangingPunct="1">
         <a:lnSpc>
           <a:spcPct val="90000"/>
         </a:lnSpc>
         <a:spcBef>
-          <a:spcPts val="827"/>
+          <a:spcPts val="984"/>
         </a:spcBef>
         <a:buFont typeface="Arial" panose="020B0604020202020204" pitchFamily="34" charset="0"/>
         <a:buChar char="•"/>
-        <a:defRPr sz="2315" kern="1200">
+        <a:defRPr sz="2756" kern="1200">
           <a:solidFill>
             <a:schemeClr val="tx1"/>
           </a:solidFill>
@@ -2710,16 +2710,16 @@
           <a:cs typeface="+mn-cs"/>
         </a:defRPr>
       </a:lvl1pPr>
-      <a:lvl2pPr marL="566951" indent="-188984" algn="l" defTabSz="755934" rtl="0" eaLnBrk="1" latinLnBrk="0" hangingPunct="1">
+      <a:lvl2pPr marL="674964" indent="-224988" algn="l" defTabSz="899952" rtl="0" eaLnBrk="1" latinLnBrk="0" hangingPunct="1">
         <a:lnSpc>
           <a:spcPct val="90000"/>
         </a:lnSpc>
         <a:spcBef>
-          <a:spcPts val="413"/>
+          <a:spcPts val="492"/>
         </a:spcBef>
         <a:buFont typeface="Arial" panose="020B0604020202020204" pitchFamily="34" charset="0"/>
         <a:buChar char="•"/>
-        <a:defRPr sz="1984" kern="1200">
+        <a:defRPr sz="2362" kern="1200">
           <a:solidFill>
             <a:schemeClr val="tx1"/>
           </a:solidFill>
@@ -2728,16 +2728,16 @@
           <a:cs typeface="+mn-cs"/>
         </a:defRPr>
       </a:lvl2pPr>
-      <a:lvl3pPr marL="944918" indent="-188984" algn="l" defTabSz="755934" rtl="0" eaLnBrk="1" latinLnBrk="0" hangingPunct="1">
+      <a:lvl3pPr marL="1124941" indent="-224988" algn="l" defTabSz="899952" rtl="0" eaLnBrk="1" latinLnBrk="0" hangingPunct="1">
         <a:lnSpc>
           <a:spcPct val="90000"/>
         </a:lnSpc>
         <a:spcBef>
-          <a:spcPts val="413"/>
+          <a:spcPts val="492"/>
         </a:spcBef>
         <a:buFont typeface="Arial" panose="020B0604020202020204" pitchFamily="34" charset="0"/>
         <a:buChar char="•"/>
-        <a:defRPr sz="1653" kern="1200">
+        <a:defRPr sz="1968" kern="1200">
           <a:solidFill>
             <a:schemeClr val="tx1"/>
           </a:solidFill>
@@ -2746,16 +2746,16 @@
           <a:cs typeface="+mn-cs"/>
         </a:defRPr>
       </a:lvl3pPr>
-      <a:lvl4pPr marL="1322885" indent="-188984" algn="l" defTabSz="755934" rtl="0" eaLnBrk="1" latinLnBrk="0" hangingPunct="1">
+      <a:lvl4pPr marL="1574917" indent="-224988" algn="l" defTabSz="899952" rtl="0" eaLnBrk="1" latinLnBrk="0" hangingPunct="1">
         <a:lnSpc>
           <a:spcPct val="90000"/>
         </a:lnSpc>
         <a:spcBef>
-          <a:spcPts val="413"/>
+          <a:spcPts val="492"/>
         </a:spcBef>
         <a:buFont typeface="Arial" panose="020B0604020202020204" pitchFamily="34" charset="0"/>
         <a:buChar char="•"/>
-        <a:defRPr sz="1488" kern="1200">
+        <a:defRPr sz="1772" kern="1200">
           <a:solidFill>
             <a:schemeClr val="tx1"/>
           </a:solidFill>
@@ -2764,16 +2764,16 @@
           <a:cs typeface="+mn-cs"/>
         </a:defRPr>
       </a:lvl4pPr>
-      <a:lvl5pPr marL="1700853" indent="-188984" algn="l" defTabSz="755934" rtl="0" eaLnBrk="1" latinLnBrk="0" hangingPunct="1">
+      <a:lvl5pPr marL="2024893" indent="-224988" algn="l" defTabSz="899952" rtl="0" eaLnBrk="1" latinLnBrk="0" hangingPunct="1">
         <a:lnSpc>
           <a:spcPct val="90000"/>
         </a:lnSpc>
         <a:spcBef>
-          <a:spcPts val="413"/>
+          <a:spcPts val="492"/>
         </a:spcBef>
         <a:buFont typeface="Arial" panose="020B0604020202020204" pitchFamily="34" charset="0"/>
         <a:buChar char="•"/>
-        <a:defRPr sz="1488" kern="1200">
+        <a:defRPr sz="1772" kern="1200">
           <a:solidFill>
             <a:schemeClr val="tx1"/>
           </a:solidFill>
@@ -2782,16 +2782,16 @@
           <a:cs typeface="+mn-cs"/>
         </a:defRPr>
       </a:lvl5pPr>
-      <a:lvl6pPr marL="2078820" indent="-188984" algn="l" defTabSz="755934" rtl="0" eaLnBrk="1" latinLnBrk="0" hangingPunct="1">
+      <a:lvl6pPr marL="2474869" indent="-224988" algn="l" defTabSz="899952" rtl="0" eaLnBrk="1" latinLnBrk="0" hangingPunct="1">
         <a:lnSpc>
           <a:spcPct val="90000"/>
         </a:lnSpc>
         <a:spcBef>
-          <a:spcPts val="413"/>
+          <a:spcPts val="492"/>
         </a:spcBef>
         <a:buFont typeface="Arial" panose="020B0604020202020204" pitchFamily="34" charset="0"/>
         <a:buChar char="•"/>
-        <a:defRPr sz="1488" kern="1200">
+        <a:defRPr sz="1772" kern="1200">
           <a:solidFill>
             <a:schemeClr val="tx1"/>
           </a:solidFill>
@@ -2800,16 +2800,16 @@
           <a:cs typeface="+mn-cs"/>
         </a:defRPr>
       </a:lvl6pPr>
-      <a:lvl7pPr marL="2456787" indent="-188984" algn="l" defTabSz="755934" rtl="0" eaLnBrk="1" latinLnBrk="0" hangingPunct="1">
+      <a:lvl7pPr marL="2924846" indent="-224988" algn="l" defTabSz="899952" rtl="0" eaLnBrk="1" latinLnBrk="0" hangingPunct="1">
         <a:lnSpc>
           <a:spcPct val="90000"/>
         </a:lnSpc>
         <a:spcBef>
-          <a:spcPts val="413"/>
+          <a:spcPts val="492"/>
         </a:spcBef>
         <a:buFont typeface="Arial" panose="020B0604020202020204" pitchFamily="34" charset="0"/>
         <a:buChar char="•"/>
-        <a:defRPr sz="1488" kern="1200">
+        <a:defRPr sz="1772" kern="1200">
           <a:solidFill>
             <a:schemeClr val="tx1"/>
           </a:solidFill>
@@ -2818,16 +2818,16 @@
           <a:cs typeface="+mn-cs"/>
         </a:defRPr>
       </a:lvl7pPr>
-      <a:lvl8pPr marL="2834754" indent="-188984" algn="l" defTabSz="755934" rtl="0" eaLnBrk="1" latinLnBrk="0" hangingPunct="1">
+      <a:lvl8pPr marL="3374822" indent="-224988" algn="l" defTabSz="899952" rtl="0" eaLnBrk="1" latinLnBrk="0" hangingPunct="1">
         <a:lnSpc>
           <a:spcPct val="90000"/>
         </a:lnSpc>
         <a:spcBef>
-          <a:spcPts val="413"/>
+          <a:spcPts val="492"/>
         </a:spcBef>
         <a:buFont typeface="Arial" panose="020B0604020202020204" pitchFamily="34" charset="0"/>
         <a:buChar char="•"/>
-        <a:defRPr sz="1488" kern="1200">
+        <a:defRPr sz="1772" kern="1200">
           <a:solidFill>
             <a:schemeClr val="tx1"/>
           </a:solidFill>
@@ -2836,16 +2836,16 @@
           <a:cs typeface="+mn-cs"/>
         </a:defRPr>
       </a:lvl8pPr>
-      <a:lvl9pPr marL="3212722" indent="-188984" algn="l" defTabSz="755934" rtl="0" eaLnBrk="1" latinLnBrk="0" hangingPunct="1">
+      <a:lvl9pPr marL="3824798" indent="-224988" algn="l" defTabSz="899952" rtl="0" eaLnBrk="1" latinLnBrk="0" hangingPunct="1">
         <a:lnSpc>
           <a:spcPct val="90000"/>
         </a:lnSpc>
         <a:spcBef>
-          <a:spcPts val="413"/>
+          <a:spcPts val="492"/>
         </a:spcBef>
         <a:buFont typeface="Arial" panose="020B0604020202020204" pitchFamily="34" charset="0"/>
         <a:buChar char="•"/>
-        <a:defRPr sz="1488" kern="1200">
+        <a:defRPr sz="1772" kern="1200">
           <a:solidFill>
             <a:schemeClr val="tx1"/>
           </a:solidFill>
@@ -2859,8 +2859,8 @@
       <a:defPPr>
         <a:defRPr lang="en-US"/>
       </a:defPPr>
-      <a:lvl1pPr marL="0" algn="l" defTabSz="755934" rtl="0" eaLnBrk="1" latinLnBrk="0" hangingPunct="1">
-        <a:defRPr sz="1488" kern="1200">
+      <a:lvl1pPr marL="0" algn="l" defTabSz="899952" rtl="0" eaLnBrk="1" latinLnBrk="0" hangingPunct="1">
+        <a:defRPr sz="1772" kern="1200">
           <a:solidFill>
             <a:schemeClr val="tx1"/>
           </a:solidFill>
@@ -2869,8 +2869,8 @@
           <a:cs typeface="+mn-cs"/>
         </a:defRPr>
       </a:lvl1pPr>
-      <a:lvl2pPr marL="377967" algn="l" defTabSz="755934" rtl="0" eaLnBrk="1" latinLnBrk="0" hangingPunct="1">
-        <a:defRPr sz="1488" kern="1200">
+      <a:lvl2pPr marL="449976" algn="l" defTabSz="899952" rtl="0" eaLnBrk="1" latinLnBrk="0" hangingPunct="1">
+        <a:defRPr sz="1772" kern="1200">
           <a:solidFill>
             <a:schemeClr val="tx1"/>
           </a:solidFill>
@@ -2879,8 +2879,8 @@
           <a:cs typeface="+mn-cs"/>
         </a:defRPr>
       </a:lvl2pPr>
-      <a:lvl3pPr marL="755934" algn="l" defTabSz="755934" rtl="0" eaLnBrk="1" latinLnBrk="0" hangingPunct="1">
-        <a:defRPr sz="1488" kern="1200">
+      <a:lvl3pPr marL="899952" algn="l" defTabSz="899952" rtl="0" eaLnBrk="1" latinLnBrk="0" hangingPunct="1">
+        <a:defRPr sz="1772" kern="1200">
           <a:solidFill>
             <a:schemeClr val="tx1"/>
           </a:solidFill>
@@ -2889,8 +2889,8 @@
           <a:cs typeface="+mn-cs"/>
         </a:defRPr>
       </a:lvl3pPr>
-      <a:lvl4pPr marL="1133902" algn="l" defTabSz="755934" rtl="0" eaLnBrk="1" latinLnBrk="0" hangingPunct="1">
-        <a:defRPr sz="1488" kern="1200">
+      <a:lvl4pPr marL="1349929" algn="l" defTabSz="899952" rtl="0" eaLnBrk="1" latinLnBrk="0" hangingPunct="1">
+        <a:defRPr sz="1772" kern="1200">
           <a:solidFill>
             <a:schemeClr val="tx1"/>
           </a:solidFill>
@@ -2899,8 +2899,8 @@
           <a:cs typeface="+mn-cs"/>
         </a:defRPr>
       </a:lvl4pPr>
-      <a:lvl5pPr marL="1511869" algn="l" defTabSz="755934" rtl="0" eaLnBrk="1" latinLnBrk="0" hangingPunct="1">
-        <a:defRPr sz="1488" kern="1200">
+      <a:lvl5pPr marL="1799905" algn="l" defTabSz="899952" rtl="0" eaLnBrk="1" latinLnBrk="0" hangingPunct="1">
+        <a:defRPr sz="1772" kern="1200">
           <a:solidFill>
             <a:schemeClr val="tx1"/>
           </a:solidFill>
@@ -2909,8 +2909,8 @@
           <a:cs typeface="+mn-cs"/>
         </a:defRPr>
       </a:lvl5pPr>
-      <a:lvl6pPr marL="1889836" algn="l" defTabSz="755934" rtl="0" eaLnBrk="1" latinLnBrk="0" hangingPunct="1">
-        <a:defRPr sz="1488" kern="1200">
+      <a:lvl6pPr marL="2249881" algn="l" defTabSz="899952" rtl="0" eaLnBrk="1" latinLnBrk="0" hangingPunct="1">
+        <a:defRPr sz="1772" kern="1200">
           <a:solidFill>
             <a:schemeClr val="tx1"/>
           </a:solidFill>
@@ -2919,8 +2919,8 @@
           <a:cs typeface="+mn-cs"/>
         </a:defRPr>
       </a:lvl6pPr>
-      <a:lvl7pPr marL="2267803" algn="l" defTabSz="755934" rtl="0" eaLnBrk="1" latinLnBrk="0" hangingPunct="1">
-        <a:defRPr sz="1488" kern="1200">
+      <a:lvl7pPr marL="2699857" algn="l" defTabSz="899952" rtl="0" eaLnBrk="1" latinLnBrk="0" hangingPunct="1">
+        <a:defRPr sz="1772" kern="1200">
           <a:solidFill>
             <a:schemeClr val="tx1"/>
           </a:solidFill>
@@ -2929,8 +2929,8 @@
           <a:cs typeface="+mn-cs"/>
         </a:defRPr>
       </a:lvl7pPr>
-      <a:lvl8pPr marL="2645771" algn="l" defTabSz="755934" rtl="0" eaLnBrk="1" latinLnBrk="0" hangingPunct="1">
-        <a:defRPr sz="1488" kern="1200">
+      <a:lvl8pPr marL="3149834" algn="l" defTabSz="899952" rtl="0" eaLnBrk="1" latinLnBrk="0" hangingPunct="1">
+        <a:defRPr sz="1772" kern="1200">
           <a:solidFill>
             <a:schemeClr val="tx1"/>
           </a:solidFill>
@@ -2939,8 +2939,8 @@
           <a:cs typeface="+mn-cs"/>
         </a:defRPr>
       </a:lvl8pPr>
-      <a:lvl9pPr marL="3023738" algn="l" defTabSz="755934" rtl="0" eaLnBrk="1" latinLnBrk="0" hangingPunct="1">
-        <a:defRPr sz="1488" kern="1200">
+      <a:lvl9pPr marL="3599810" algn="l" defTabSz="899952" rtl="0" eaLnBrk="1" latinLnBrk="0" hangingPunct="1">
+        <a:defRPr sz="1772" kern="1200">
           <a:solidFill>
             <a:schemeClr val="tx1"/>
           </a:solidFill>
@@ -2979,7 +2979,7 @@
         </p:nvSpPr>
         <p:spPr>
           <a:xfrm>
-            <a:off x="4439765" y="999394"/>
+            <a:off x="5670238" y="946054"/>
             <a:ext cx="2899071" cy="1003300"/>
           </a:xfrm>
           <a:prstGeom prst="roundRect">
@@ -3027,7 +3027,7 @@
         </p:nvSpPr>
         <p:spPr>
           <a:xfrm>
-            <a:off x="280513" y="268629"/>
+            <a:off x="291785" y="215289"/>
             <a:ext cx="3543300" cy="5899666"/>
           </a:xfrm>
           <a:prstGeom prst="roundRect">
@@ -3075,7 +3075,7 @@
         </p:nvSpPr>
         <p:spPr>
           <a:xfrm>
-            <a:off x="4964929" y="2263047"/>
+            <a:off x="5689303" y="2340463"/>
             <a:ext cx="1988731" cy="1841500"/>
           </a:xfrm>
           <a:prstGeom prst="roundRect">
@@ -3123,7 +3123,7 @@
         </p:nvSpPr>
         <p:spPr>
           <a:xfrm>
-            <a:off x="921863" y="1276691"/>
+            <a:off x="933136" y="1223351"/>
             <a:ext cx="2363381" cy="800100"/>
           </a:xfrm>
           <a:prstGeom prst="roundRect">
@@ -3169,7 +3169,7 @@
         </p:nvSpPr>
         <p:spPr>
           <a:xfrm>
-            <a:off x="896465" y="3115014"/>
+            <a:off x="907738" y="3061674"/>
             <a:ext cx="2363381" cy="2295186"/>
           </a:xfrm>
           <a:prstGeom prst="roundRect">
@@ -3209,59 +3209,13 @@
       </p:sp>
       <p:sp>
         <p:nvSpPr>
-          <p:cNvPr id="11" name="Abgerundetes Rechteck 10"/>
-          <p:cNvSpPr/>
-          <p:nvPr/>
-        </p:nvSpPr>
-        <p:spPr>
-          <a:xfrm>
-            <a:off x="4582933" y="1416908"/>
-            <a:ext cx="2628900" cy="428625"/>
-          </a:xfrm>
-          <a:prstGeom prst="roundRect">
-            <a:avLst/>
-          </a:prstGeom>
-        </p:spPr>
-        <p:style>
-          <a:lnRef idx="2">
-            <a:schemeClr val="accent1"/>
-          </a:lnRef>
-          <a:fillRef idx="1">
-            <a:schemeClr val="lt1"/>
-          </a:fillRef>
-          <a:effectRef idx="0">
-            <a:schemeClr val="accent1"/>
-          </a:effectRef>
-          <a:fontRef idx="minor">
-            <a:schemeClr val="dk1"/>
-          </a:fontRef>
-        </p:style>
-        <p:txBody>
-          <a:bodyPr rot="0" spcFirstLastPara="0" vertOverflow="overflow" horzOverflow="overflow" vert="horz" wrap="square" lIns="91440" tIns="45720" rIns="91440" bIns="45720" numCol="1" spcCol="0" rtlCol="0" fromWordArt="0" anchor="ctr" anchorCtr="0" forceAA="0" compatLnSpc="1">
-            <a:prstTxWarp prst="textNoShape">
-              <a:avLst/>
-            </a:prstTxWarp>
-            <a:noAutofit/>
-          </a:bodyPr>
-          <a:lstStyle/>
-          <a:p>
-            <a:pPr algn="ctr"/>
-            <a:r>
-              <a:rPr lang="de-DE" dirty="0"/>
-              <a:t>Vaadin Client-Side Engine</a:t>
-            </a:r>
-          </a:p>
-        </p:txBody>
-      </p:sp>
-      <p:sp>
-        <p:nvSpPr>
           <p:cNvPr id="12" name="Zylinder 11"/>
           <p:cNvSpPr/>
           <p:nvPr/>
         </p:nvSpPr>
         <p:spPr>
           <a:xfrm>
-            <a:off x="4803593" y="4918397"/>
+            <a:off x="5689303" y="5016673"/>
             <a:ext cx="2311400" cy="1041400"/>
           </a:xfrm>
           <a:prstGeom prst="can">
@@ -3301,52 +3255,6 @@
           </a:p>
         </p:txBody>
       </p:sp>
-      <p:sp>
-        <p:nvSpPr>
-          <p:cNvPr id="13" name="Abgerundetes Rechteck 12"/>
-          <p:cNvSpPr/>
-          <p:nvPr/>
-        </p:nvSpPr>
-        <p:spPr>
-          <a:xfrm>
-            <a:off x="5194118" y="3231423"/>
-            <a:ext cx="1556341" cy="669925"/>
-          </a:xfrm>
-          <a:prstGeom prst="roundRect">
-            <a:avLst/>
-          </a:prstGeom>
-        </p:spPr>
-        <p:style>
-          <a:lnRef idx="2">
-            <a:schemeClr val="accent1"/>
-          </a:lnRef>
-          <a:fillRef idx="1">
-            <a:schemeClr val="lt1"/>
-          </a:fillRef>
-          <a:effectRef idx="0">
-            <a:schemeClr val="accent1"/>
-          </a:effectRef>
-          <a:fontRef idx="minor">
-            <a:schemeClr val="dk1"/>
-          </a:fontRef>
-        </p:style>
-        <p:txBody>
-          <a:bodyPr rot="0" spcFirstLastPara="0" vertOverflow="overflow" horzOverflow="overflow" vert="horz" wrap="square" lIns="91440" tIns="45720" rIns="91440" bIns="45720" numCol="1" spcCol="0" rtlCol="0" fromWordArt="0" anchor="ctr" anchorCtr="0" forceAA="0" compatLnSpc="1">
-            <a:prstTxWarp prst="textNoShape">
-              <a:avLst/>
-            </a:prstTxWarp>
-            <a:noAutofit/>
-          </a:bodyPr>
-          <a:lstStyle/>
-          <a:p>
-            <a:pPr algn="ctr"/>
-            <a:r>
-              <a:rPr lang="de-DE" dirty="0"/>
-              <a:t>Plugin</a:t>
-            </a:r>
-          </a:p>
-        </p:txBody>
-      </p:sp>
       <p:cxnSp>
         <p:nvCxnSpPr>
           <p:cNvPr id="22" name="Gerader Verbinder 21"/>
@@ -3355,7 +3263,7 @@
         </p:nvCxnSpPr>
         <p:spPr>
           <a:xfrm>
-            <a:off x="4095681" y="268629"/>
+            <a:off x="5585233" y="215290"/>
             <a:ext cx="0" cy="6691531"/>
           </a:xfrm>
           <a:prstGeom prst="line">
@@ -3388,8 +3296,8 @@
         </p:nvSpPr>
         <p:spPr>
           <a:xfrm>
-            <a:off x="116115" y="6498496"/>
-            <a:ext cx="3979567" cy="461665"/>
+            <a:off x="127388" y="6445157"/>
+            <a:ext cx="5457844" cy="461665"/>
           </a:xfrm>
           <a:prstGeom prst="rect">
             <a:avLst/>
@@ -3418,8 +3326,8 @@
         </p:nvSpPr>
         <p:spPr>
           <a:xfrm>
-            <a:off x="4095681" y="6498496"/>
-            <a:ext cx="3580108" cy="461665"/>
+            <a:off x="5585233" y="6445157"/>
+            <a:ext cx="3324594" cy="461665"/>
           </a:xfrm>
           <a:prstGeom prst="rect">
             <a:avLst/>
@@ -3448,7 +3356,7 @@
         </p:nvCxnSpPr>
         <p:spPr>
           <a:xfrm flipH="1">
-            <a:off x="3303058" y="1645507"/>
+            <a:off x="3314330" y="1592167"/>
             <a:ext cx="1232602" cy="0"/>
           </a:xfrm>
           <a:prstGeom prst="straightConnector1">
@@ -3482,7 +3390,7 @@
         </p:nvCxnSpPr>
         <p:spPr>
           <a:xfrm flipH="1">
-            <a:off x="3259847" y="3515067"/>
+            <a:off x="3271120" y="3461728"/>
             <a:ext cx="1934271" cy="1"/>
           </a:xfrm>
           <a:prstGeom prst="straightConnector1">
@@ -3516,7 +3424,7 @@
         </p:nvCxnSpPr>
         <p:spPr>
           <a:xfrm>
-            <a:off x="2103551" y="2076793"/>
+            <a:off x="2114823" y="2023454"/>
             <a:ext cx="0" cy="1038223"/>
           </a:xfrm>
           <a:prstGeom prst="straightConnector1">
@@ -3550,8 +3458,8 @@
         </p:nvCxnSpPr>
         <p:spPr>
           <a:xfrm>
-            <a:off x="3275701" y="4407387"/>
-            <a:ext cx="2696587" cy="0"/>
+            <a:off x="3286974" y="4354047"/>
+            <a:ext cx="3545329" cy="0"/>
           </a:xfrm>
           <a:prstGeom prst="line">
             <a:avLst/>
@@ -3584,8 +3492,8 @@
         </p:nvCxnSpPr>
         <p:spPr>
           <a:xfrm>
-            <a:off x="5946593" y="4407387"/>
-            <a:ext cx="0" cy="511010"/>
+            <a:off x="6832303" y="4323567"/>
+            <a:ext cx="0" cy="693106"/>
           </a:xfrm>
           <a:prstGeom prst="straightConnector1">
             <a:avLst/>
@@ -3617,7 +3525,7 @@
         </p:nvSpPr>
         <p:spPr>
           <a:xfrm>
-            <a:off x="1063206" y="4188202"/>
+            <a:off x="1074478" y="4134862"/>
             <a:ext cx="2045754" cy="1041400"/>
           </a:xfrm>
           <a:prstGeom prst="can">
@@ -3651,6 +3559,98 @@
             <a:r>
               <a:rPr lang="de-DE" dirty="0"/>
               <a:t>H2 Datenbank</a:t>
+            </a:r>
+          </a:p>
+        </p:txBody>
+      </p:sp>
+      <p:sp>
+        <p:nvSpPr>
+          <p:cNvPr id="11" name="Abgerundetes Rechteck 10"/>
+          <p:cNvSpPr/>
+          <p:nvPr/>
+        </p:nvSpPr>
+        <p:spPr>
+          <a:xfrm>
+            <a:off x="4685645" y="1363569"/>
+            <a:ext cx="2628900" cy="428625"/>
+          </a:xfrm>
+          <a:prstGeom prst="roundRect">
+            <a:avLst/>
+          </a:prstGeom>
+        </p:spPr>
+        <p:style>
+          <a:lnRef idx="2">
+            <a:schemeClr val="accent1"/>
+          </a:lnRef>
+          <a:fillRef idx="1">
+            <a:schemeClr val="lt1"/>
+          </a:fillRef>
+          <a:effectRef idx="0">
+            <a:schemeClr val="accent1"/>
+          </a:effectRef>
+          <a:fontRef idx="minor">
+            <a:schemeClr val="dk1"/>
+          </a:fontRef>
+        </p:style>
+        <p:txBody>
+          <a:bodyPr rot="0" spcFirstLastPara="0" vertOverflow="overflow" horzOverflow="overflow" vert="horz" wrap="square" lIns="91440" tIns="45720" rIns="91440" bIns="45720" numCol="1" spcCol="0" rtlCol="0" fromWordArt="0" anchor="ctr" anchorCtr="0" forceAA="0" compatLnSpc="1">
+            <a:prstTxWarp prst="textNoShape">
+              <a:avLst/>
+            </a:prstTxWarp>
+            <a:noAutofit/>
+          </a:bodyPr>
+          <a:lstStyle/>
+          <a:p>
+            <a:pPr algn="ctr"/>
+            <a:r>
+              <a:rPr lang="de-DE" dirty="0"/>
+              <a:t>Vaadin Client-Side Engine</a:t>
+            </a:r>
+          </a:p>
+        </p:txBody>
+      </p:sp>
+      <p:sp>
+        <p:nvSpPr>
+          <p:cNvPr id="13" name="Abgerundetes Rechteck 12"/>
+          <p:cNvSpPr/>
+          <p:nvPr/>
+        </p:nvSpPr>
+        <p:spPr>
+          <a:xfrm>
+            <a:off x="5235871" y="3178084"/>
+            <a:ext cx="1218269" cy="862379"/>
+          </a:xfrm>
+          <a:prstGeom prst="roundRect">
+            <a:avLst/>
+          </a:prstGeom>
+        </p:spPr>
+        <p:style>
+          <a:lnRef idx="2">
+            <a:schemeClr val="accent1"/>
+          </a:lnRef>
+          <a:fillRef idx="1">
+            <a:schemeClr val="lt1"/>
+          </a:fillRef>
+          <a:effectRef idx="0">
+            <a:schemeClr val="accent1"/>
+          </a:effectRef>
+          <a:fontRef idx="minor">
+            <a:schemeClr val="dk1"/>
+          </a:fontRef>
+        </p:style>
+        <p:txBody>
+          <a:bodyPr rot="0" spcFirstLastPara="0" vertOverflow="overflow" horzOverflow="overflow" vert="horz" wrap="square" lIns="91440" tIns="45720" rIns="91440" bIns="45720" numCol="1" spcCol="0" rtlCol="0" fromWordArt="0" anchor="ctr" anchorCtr="0" forceAA="0" compatLnSpc="1">
+            <a:prstTxWarp prst="textNoShape">
+              <a:avLst/>
+            </a:prstTxWarp>
+            <a:noAutofit/>
+          </a:bodyPr>
+          <a:lstStyle/>
+          <a:p>
+            <a:pPr algn="ctr"/>
+            <a:r>
+              <a:rPr lang="de-DE" dirty="0"/>
+              <a:t>Plugin</a:t>
             </a:r>
           </a:p>
         </p:txBody>

</xml_diff>